<commit_message>
Copy Files From Source Repo (2025-02-12 19:14)
</commit_message>
<xml_diff>
--- a/ResourceFiles/Mystic Spice Premium Chai Market Analysis Presentation.pptx
+++ b/ResourceFiles/Mystic Spice Premium Chai Market Analysis Presentation.pptx
@@ -1,6 +1,6 @@
 
 <file path=ppt/presentation.xml><?xml version="1.0" encoding="utf-8"?>
-<!--Generated by Aspose.Slides for Java 23.6.1-->
+<!--Generated by Aspose.Slides for Java 23.6-->
 <p:presentation xmlns:r="http://schemas.openxmlformats.org/officeDocument/2006/relationships" xmlns:a="http://schemas.openxmlformats.org/drawingml/2006/main" xmlns:p="http://schemas.openxmlformats.org/presentationml/2006/main" removePersonalInfoOnSave="1" saveSubsetFonts="1">
   <p:sldMasterIdLst>
     <p:sldMasterId id="2147483660" r:id="rId1"/>
@@ -8305,6 +8305,77 @@
           </a:prstGeom>
         </p:spPr>
       </p:pic>
+      <p:sp>
+        <p:nvSpPr>
+          <p:cNvPr id="20" name="TextBox"/>
+          <p:cNvSpPr txBox="1">
+            <a:spLocks noGrp="1" noSelect="1" noRot="1" noMove="1"/>
+          </p:cNvSpPr>
+          <p:nvPr/>
+        </p:nvSpPr>
+        <p:spPr>
+          <a:xfrm>
+            <a:off x="2890520" y="2644140"/>
+            <a:ext cx="6411372" cy="1569660"/>
+          </a:xfrm>
+          <a:prstGeom prst="rect">
+            <a:avLst/>
+          </a:prstGeom>
+          <a:noFill/>
+        </p:spPr>
+        <p:txBody>
+          <a:bodyPr wrap="none" rtlCol="0" anchor="ctr" anchorCtr="1">
+            <a:spAutoFit/>
+          </a:bodyPr>
+          <a:lstStyle>
+            <a:lvl1pPr algn="l">
+              <a:lnSpc>
+                <a:spcPct val="150000"/>
+              </a:lnSpc>
+              <a:spcBef>
+                <a:spcPct val="0"/>
+              </a:spcBef>
+              <a:spcAft>
+                <a:spcPct val="0"/>
+              </a:spcAft>
+              <a:defRPr lang="en-US" sz="3200" b="1" noProof="1" dirty="0">
+                <a:solidFill>
+                  <a:prstClr val="red">
+                    <a:lumOff val="30000"/>
+                    <a:alpha val="40000"/>
+                  </a:prstClr>
+                </a:solidFill>
+                <a:effectLst>
+                  <a:outerShdw blurRad="50800" dist="38100" algn="tr" rotWithShape="0">
+                    <a:prstClr val="black">
+                      <a:alpha val="80000"/>
+                    </a:prstClr>
+                  </a:outerShdw>
+                </a:effectLst>
+                <a:latin typeface="Calibri" pitchFamily="34" charset="0"/>
+              </a:defRPr>
+            </a:lvl1pPr>
+          </a:lstStyle>
+          <a:p>
+            <a:pPr algn="ctr"/>
+            <a:r>
+              <a:t>Evaluation only.</a:t>
+            </a:r>
+          </a:p>
+          <a:p>
+            <a:pPr algn="ctr"/>
+            <a:r>
+              <a:t>Created with Aspose.Slides for Java 23.6.</a:t>
+            </a:r>
+          </a:p>
+          <a:p>
+            <a:pPr algn="ctr"/>
+            <a:r>
+              <a:t>Copyright 2004-2023 Aspose Pty Ltd.</a:t>
+            </a:r>
+          </a:p>
+        </p:txBody>
+      </p:sp>
     </p:spTree>
     <p:extLst>
       <p:ext uri="{BB962C8B-B14F-4D97-AF65-F5344CB8AC3E}">
@@ -8960,6 +9031,77 @@
           </a:prstGeom>
         </p:spPr>
       </p:pic>
+      <p:sp>
+        <p:nvSpPr>
+          <p:cNvPr id="17" name="TextBox"/>
+          <p:cNvSpPr txBox="1">
+            <a:spLocks noGrp="1" noSelect="1" noRot="1" noMove="1"/>
+          </p:cNvSpPr>
+          <p:nvPr/>
+        </p:nvSpPr>
+        <p:spPr>
+          <a:xfrm>
+            <a:off x="2890520" y="2644140"/>
+            <a:ext cx="6411372" cy="1569660"/>
+          </a:xfrm>
+          <a:prstGeom prst="rect">
+            <a:avLst/>
+          </a:prstGeom>
+          <a:noFill/>
+        </p:spPr>
+        <p:txBody>
+          <a:bodyPr wrap="none" rtlCol="0" anchor="ctr" anchorCtr="1">
+            <a:spAutoFit/>
+          </a:bodyPr>
+          <a:lstStyle>
+            <a:lvl1pPr algn="l">
+              <a:lnSpc>
+                <a:spcPct val="150000"/>
+              </a:lnSpc>
+              <a:spcBef>
+                <a:spcPct val="0"/>
+              </a:spcBef>
+              <a:spcAft>
+                <a:spcPct val="0"/>
+              </a:spcAft>
+              <a:defRPr lang="en-US" sz="3200" b="1" noProof="1" dirty="0">
+                <a:solidFill>
+                  <a:prstClr val="red">
+                    <a:lumOff val="30000"/>
+                    <a:alpha val="40000"/>
+                  </a:prstClr>
+                </a:solidFill>
+                <a:effectLst>
+                  <a:outerShdw blurRad="50800" dist="38100" algn="tr" rotWithShape="0">
+                    <a:prstClr val="black">
+                      <a:alpha val="80000"/>
+                    </a:prstClr>
+                  </a:outerShdw>
+                </a:effectLst>
+                <a:latin typeface="Calibri" pitchFamily="34" charset="0"/>
+              </a:defRPr>
+            </a:lvl1pPr>
+          </a:lstStyle>
+          <a:p>
+            <a:pPr algn="ctr"/>
+            <a:r>
+              <a:t>Evaluation only.</a:t>
+            </a:r>
+          </a:p>
+          <a:p>
+            <a:pPr algn="ctr"/>
+            <a:r>
+              <a:t>Created with Aspose.Slides for Java 23.6.</a:t>
+            </a:r>
+          </a:p>
+          <a:p>
+            <a:pPr algn="ctr"/>
+            <a:r>
+              <a:t>Copyright 2004-2023 Aspose Pty Ltd.</a:t>
+            </a:r>
+          </a:p>
+        </p:txBody>
+      </p:sp>
     </p:spTree>
     <p:extLst>
       <p:ext uri="{BB962C8B-B14F-4D97-AF65-F5344CB8AC3E}">
@@ -9420,6 +9562,77 @@
           </a:p>
         </p:txBody>
       </p:sp>
+      <p:sp>
+        <p:nvSpPr>
+          <p:cNvPr id="11" name="TextBox"/>
+          <p:cNvSpPr txBox="1">
+            <a:spLocks noGrp="1" noSelect="1" noRot="1" noMove="1"/>
+          </p:cNvSpPr>
+          <p:nvPr/>
+        </p:nvSpPr>
+        <p:spPr>
+          <a:xfrm>
+            <a:off x="2890520" y="2644140"/>
+            <a:ext cx="6411372" cy="1569660"/>
+          </a:xfrm>
+          <a:prstGeom prst="rect">
+            <a:avLst/>
+          </a:prstGeom>
+          <a:noFill/>
+        </p:spPr>
+        <p:txBody>
+          <a:bodyPr wrap="none" rtlCol="0" anchor="ctr" anchorCtr="1">
+            <a:spAutoFit/>
+          </a:bodyPr>
+          <a:lstStyle>
+            <a:lvl1pPr algn="l">
+              <a:lnSpc>
+                <a:spcPct val="150000"/>
+              </a:lnSpc>
+              <a:spcBef>
+                <a:spcPct val="0"/>
+              </a:spcBef>
+              <a:spcAft>
+                <a:spcPct val="0"/>
+              </a:spcAft>
+              <a:defRPr lang="en-US" sz="3200" b="1" noProof="1" dirty="0">
+                <a:solidFill>
+                  <a:prstClr val="red">
+                    <a:lumOff val="30000"/>
+                    <a:alpha val="40000"/>
+                  </a:prstClr>
+                </a:solidFill>
+                <a:effectLst>
+                  <a:outerShdw blurRad="50800" dist="38100" algn="tr" rotWithShape="0">
+                    <a:prstClr val="black">
+                      <a:alpha val="80000"/>
+                    </a:prstClr>
+                  </a:outerShdw>
+                </a:effectLst>
+                <a:latin typeface="Calibri" pitchFamily="34" charset="0"/>
+              </a:defRPr>
+            </a:lvl1pPr>
+          </a:lstStyle>
+          <a:p>
+            <a:pPr algn="ctr"/>
+            <a:r>
+              <a:t>Evaluation only.</a:t>
+            </a:r>
+          </a:p>
+          <a:p>
+            <a:pPr algn="ctr"/>
+            <a:r>
+              <a:t>Created with Aspose.Slides for Java 23.6.</a:t>
+            </a:r>
+          </a:p>
+          <a:p>
+            <a:pPr algn="ctr"/>
+            <a:r>
+              <a:t>Copyright 2004-2023 Aspose Pty Ltd.</a:t>
+            </a:r>
+          </a:p>
+        </p:txBody>
+      </p:sp>
     </p:spTree>
     <p:extLst>
       <p:ext uri="{BB962C8B-B14F-4D97-AF65-F5344CB8AC3E}">
@@ -9847,6 +10060,77 @@
                 <a:cs typeface="Franklin Gothic Book"/>
               </a:rPr>
               <a:t>Un aumento del 25 % en la satisfacción del cliente y las tasas de retención del té chai en la región</a:t>
+            </a:r>
+          </a:p>
+        </p:txBody>
+      </p:sp>
+      <p:sp>
+        <p:nvSpPr>
+          <p:cNvPr id="17" name="TextBox"/>
+          <p:cNvSpPr txBox="1">
+            <a:spLocks noGrp="1" noSelect="1" noRot="1" noMove="1"/>
+          </p:cNvSpPr>
+          <p:nvPr/>
+        </p:nvSpPr>
+        <p:spPr>
+          <a:xfrm>
+            <a:off x="2890520" y="2644140"/>
+            <a:ext cx="6411372" cy="1569660"/>
+          </a:xfrm>
+          <a:prstGeom prst="rect">
+            <a:avLst/>
+          </a:prstGeom>
+          <a:noFill/>
+        </p:spPr>
+        <p:txBody>
+          <a:bodyPr wrap="none" rtlCol="0" anchor="ctr" anchorCtr="1">
+            <a:spAutoFit/>
+          </a:bodyPr>
+          <a:lstStyle>
+            <a:lvl1pPr algn="l">
+              <a:lnSpc>
+                <a:spcPct val="150000"/>
+              </a:lnSpc>
+              <a:spcBef>
+                <a:spcPct val="0"/>
+              </a:spcBef>
+              <a:spcAft>
+                <a:spcPct val="0"/>
+              </a:spcAft>
+              <a:defRPr lang="en-US" sz="3200" b="1" noProof="1" dirty="0">
+                <a:solidFill>
+                  <a:prstClr val="red">
+                    <a:lumOff val="30000"/>
+                    <a:alpha val="40000"/>
+                  </a:prstClr>
+                </a:solidFill>
+                <a:effectLst>
+                  <a:outerShdw blurRad="50800" dist="38100" algn="tr" rotWithShape="0">
+                    <a:prstClr val="black">
+                      <a:alpha val="80000"/>
+                    </a:prstClr>
+                  </a:outerShdw>
+                </a:effectLst>
+                <a:latin typeface="Calibri" pitchFamily="34" charset="0"/>
+              </a:defRPr>
+            </a:lvl1pPr>
+          </a:lstStyle>
+          <a:p>
+            <a:pPr algn="ctr"/>
+            <a:r>
+              <a:t>Evaluation only.</a:t>
+            </a:r>
+          </a:p>
+          <a:p>
+            <a:pPr algn="ctr"/>
+            <a:r>
+              <a:t>Created with Aspose.Slides for Java 23.6.</a:t>
+            </a:r>
+          </a:p>
+          <a:p>
+            <a:pPr algn="ctr"/>
+            <a:r>
+              <a:t>Copyright 2004-2023 Aspose Pty Ltd.</a:t>
             </a:r>
           </a:p>
         </p:txBody>
@@ -10078,7 +10362,7 @@
         </p:spPr>
         <p:txBody>
           <a:bodyPr anchor="ctr">
-            <a:normAutofit fontScale="92500" lnSpcReduction="20000"/>
+            <a:normAutofit fontScale="97500" lnSpcReduction="10000"/>
           </a:bodyPr>
           <a:lstStyle/>
           <a:p>
@@ -10149,6 +10433,77 @@
                 <a:cs typeface="Franklin Gothic Book"/>
               </a:rPr>
               <a:t>Problemas medioambientales y sociales que pueden afectar al suministro y a la calidad de los ingredientes del té chai</a:t>
+            </a:r>
+          </a:p>
+        </p:txBody>
+      </p:sp>
+      <p:sp>
+        <p:nvSpPr>
+          <p:cNvPr id="11" name="TextBox"/>
+          <p:cNvSpPr txBox="1">
+            <a:spLocks noGrp="1" noSelect="1" noRot="1" noMove="1"/>
+          </p:cNvSpPr>
+          <p:nvPr/>
+        </p:nvSpPr>
+        <p:spPr>
+          <a:xfrm>
+            <a:off x="2890520" y="2644140"/>
+            <a:ext cx="6411372" cy="1569660"/>
+          </a:xfrm>
+          <a:prstGeom prst="rect">
+            <a:avLst/>
+          </a:prstGeom>
+          <a:noFill/>
+        </p:spPr>
+        <p:txBody>
+          <a:bodyPr wrap="none" rtlCol="0" anchor="ctr" anchorCtr="1">
+            <a:spAutoFit/>
+          </a:bodyPr>
+          <a:lstStyle>
+            <a:lvl1pPr algn="l">
+              <a:lnSpc>
+                <a:spcPct val="150000"/>
+              </a:lnSpc>
+              <a:spcBef>
+                <a:spcPct val="0"/>
+              </a:spcBef>
+              <a:spcAft>
+                <a:spcPct val="0"/>
+              </a:spcAft>
+              <a:defRPr lang="en-US" sz="3200" b="1" noProof="1" dirty="0">
+                <a:solidFill>
+                  <a:prstClr val="red">
+                    <a:lumOff val="30000"/>
+                    <a:alpha val="40000"/>
+                  </a:prstClr>
+                </a:solidFill>
+                <a:effectLst>
+                  <a:outerShdw blurRad="50800" dist="38100" algn="tr" rotWithShape="0">
+                    <a:prstClr val="black">
+                      <a:alpha val="80000"/>
+                    </a:prstClr>
+                  </a:outerShdw>
+                </a:effectLst>
+                <a:latin typeface="Calibri" pitchFamily="34" charset="0"/>
+              </a:defRPr>
+            </a:lvl1pPr>
+          </a:lstStyle>
+          <a:p>
+            <a:pPr algn="ctr"/>
+            <a:r>
+              <a:t>Evaluation only.</a:t>
+            </a:r>
+          </a:p>
+          <a:p>
+            <a:pPr algn="ctr"/>
+            <a:r>
+              <a:t>Created with Aspose.Slides for Java 23.6.</a:t>
+            </a:r>
+          </a:p>
+          <a:p>
+            <a:pPr algn="ctr"/>
+            <a:r>
+              <a:t>Copyright 2004-2023 Aspose Pty Ltd.</a:t>
             </a:r>
           </a:p>
         </p:txBody>
@@ -10380,7 +10735,7 @@
         </p:spPr>
         <p:txBody>
           <a:bodyPr anchor="ctr">
-            <a:normAutofit fontScale="95000" lnSpcReduction="20000"/>
+            <a:normAutofit lnSpcReduction="10000"/>
           </a:bodyPr>
           <a:lstStyle/>
           <a:p>
@@ -10571,6 +10926,77 @@
                 <a:cs typeface="Franklin Gothic Book"/>
               </a:rPr>
               <a:t>Supervisar, evaluar y ajustar el plan y la estrategia de promoción de forma constante</a:t>
+            </a:r>
+          </a:p>
+        </p:txBody>
+      </p:sp>
+      <p:sp>
+        <p:nvSpPr>
+          <p:cNvPr id="11" name="TextBox"/>
+          <p:cNvSpPr txBox="1">
+            <a:spLocks noGrp="1" noSelect="1" noRot="1" noMove="1"/>
+          </p:cNvSpPr>
+          <p:nvPr/>
+        </p:nvSpPr>
+        <p:spPr>
+          <a:xfrm>
+            <a:off x="2890520" y="2644140"/>
+            <a:ext cx="6411372" cy="1569660"/>
+          </a:xfrm>
+          <a:prstGeom prst="rect">
+            <a:avLst/>
+          </a:prstGeom>
+          <a:noFill/>
+        </p:spPr>
+        <p:txBody>
+          <a:bodyPr wrap="none" rtlCol="0" anchor="ctr" anchorCtr="1">
+            <a:spAutoFit/>
+          </a:bodyPr>
+          <a:lstStyle>
+            <a:lvl1pPr algn="l">
+              <a:lnSpc>
+                <a:spcPct val="150000"/>
+              </a:lnSpc>
+              <a:spcBef>
+                <a:spcPct val="0"/>
+              </a:spcBef>
+              <a:spcAft>
+                <a:spcPct val="0"/>
+              </a:spcAft>
+              <a:defRPr lang="en-US" sz="3200" b="1" noProof="1" dirty="0">
+                <a:solidFill>
+                  <a:prstClr val="red">
+                    <a:lumOff val="30000"/>
+                    <a:alpha val="40000"/>
+                  </a:prstClr>
+                </a:solidFill>
+                <a:effectLst>
+                  <a:outerShdw blurRad="50800" dist="38100" algn="tr" rotWithShape="0">
+                    <a:prstClr val="black">
+                      <a:alpha val="80000"/>
+                    </a:prstClr>
+                  </a:outerShdw>
+                </a:effectLst>
+                <a:latin typeface="Calibri" pitchFamily="34" charset="0"/>
+              </a:defRPr>
+            </a:lvl1pPr>
+          </a:lstStyle>
+          <a:p>
+            <a:pPr algn="ctr"/>
+            <a:r>
+              <a:t>Evaluation only.</a:t>
+            </a:r>
+          </a:p>
+          <a:p>
+            <a:pPr algn="ctr"/>
+            <a:r>
+              <a:t>Created with Aspose.Slides for Java 23.6.</a:t>
+            </a:r>
+          </a:p>
+          <a:p>
+            <a:pPr algn="ctr"/>
+            <a:r>
+              <a:t>Copyright 2004-2023 Aspose Pty Ltd.</a:t>
             </a:r>
           </a:p>
         </p:txBody>
@@ -11055,6 +11481,77 @@
           </a:p>
         </p:txBody>
       </p:sp>
+      <p:sp>
+        <p:nvSpPr>
+          <p:cNvPr id="20" name="TextBox"/>
+          <p:cNvSpPr txBox="1">
+            <a:spLocks noGrp="1" noSelect="1" noRot="1" noMove="1"/>
+          </p:cNvSpPr>
+          <p:nvPr/>
+        </p:nvSpPr>
+        <p:spPr>
+          <a:xfrm>
+            <a:off x="2890520" y="2644140"/>
+            <a:ext cx="6411372" cy="1569660"/>
+          </a:xfrm>
+          <a:prstGeom prst="rect">
+            <a:avLst/>
+          </a:prstGeom>
+          <a:noFill/>
+        </p:spPr>
+        <p:txBody>
+          <a:bodyPr wrap="none" rtlCol="0" anchor="ctr" anchorCtr="1">
+            <a:spAutoFit/>
+          </a:bodyPr>
+          <a:lstStyle>
+            <a:lvl1pPr algn="l">
+              <a:lnSpc>
+                <a:spcPct val="150000"/>
+              </a:lnSpc>
+              <a:spcBef>
+                <a:spcPct val="0"/>
+              </a:spcBef>
+              <a:spcAft>
+                <a:spcPct val="0"/>
+              </a:spcAft>
+              <a:defRPr lang="en-US" sz="3200" b="1" noProof="1" dirty="0">
+                <a:solidFill>
+                  <a:prstClr val="red">
+                    <a:lumOff val="30000"/>
+                    <a:alpha val="40000"/>
+                  </a:prstClr>
+                </a:solidFill>
+                <a:effectLst>
+                  <a:outerShdw blurRad="50800" dist="38100" algn="tr" rotWithShape="0">
+                    <a:prstClr val="black">
+                      <a:alpha val="80000"/>
+                    </a:prstClr>
+                  </a:outerShdw>
+                </a:effectLst>
+                <a:latin typeface="Calibri" pitchFamily="34" charset="0"/>
+              </a:defRPr>
+            </a:lvl1pPr>
+          </a:lstStyle>
+          <a:p>
+            <a:pPr algn="ctr"/>
+            <a:r>
+              <a:t>Evaluation only.</a:t>
+            </a:r>
+          </a:p>
+          <a:p>
+            <a:pPr algn="ctr"/>
+            <a:r>
+              <a:t>Created with Aspose.Slides for Java 23.6.</a:t>
+            </a:r>
+          </a:p>
+          <a:p>
+            <a:pPr algn="ctr"/>
+            <a:r>
+              <a:t>Copyright 2004-2023 Aspose Pty Ltd.</a:t>
+            </a:r>
+          </a:p>
+        </p:txBody>
+      </p:sp>
     </p:spTree>
     <p:extLst>
       <p:ext uri="{BB962C8B-B14F-4D97-AF65-F5344CB8AC3E}">
@@ -11391,7 +11888,7 @@
         </p:spPr>
         <p:txBody>
           <a:bodyPr vert="horz" lIns="0" tIns="45720" rIns="0" bIns="45720" rtlCol="0">
-            <a:normAutofit fontScale="95000" lnSpcReduction="20000"/>
+            <a:normAutofit lnSpcReduction="10000"/>
           </a:bodyPr>
           <a:lstStyle/>
           <a:p>
@@ -11562,6 +12059,77 @@
           </a:prstGeom>
         </p:spPr>
       </p:pic>
+      <p:sp>
+        <p:nvSpPr>
+          <p:cNvPr id="30" name="TextBox"/>
+          <p:cNvSpPr txBox="1">
+            <a:spLocks noGrp="1" noSelect="1" noRot="1" noMove="1"/>
+          </p:cNvSpPr>
+          <p:nvPr/>
+        </p:nvSpPr>
+        <p:spPr>
+          <a:xfrm>
+            <a:off x="2890520" y="2644140"/>
+            <a:ext cx="6411372" cy="1569660"/>
+          </a:xfrm>
+          <a:prstGeom prst="rect">
+            <a:avLst/>
+          </a:prstGeom>
+          <a:noFill/>
+        </p:spPr>
+        <p:txBody>
+          <a:bodyPr wrap="none" rtlCol="0" anchor="ctr" anchorCtr="1">
+            <a:spAutoFit/>
+          </a:bodyPr>
+          <a:lstStyle>
+            <a:lvl1pPr algn="l">
+              <a:lnSpc>
+                <a:spcPct val="150000"/>
+              </a:lnSpc>
+              <a:spcBef>
+                <a:spcPct val="0"/>
+              </a:spcBef>
+              <a:spcAft>
+                <a:spcPct val="0"/>
+              </a:spcAft>
+              <a:defRPr lang="en-US" sz="3200" b="1" noProof="1" dirty="0">
+                <a:solidFill>
+                  <a:prstClr val="red">
+                    <a:lumOff val="30000"/>
+                    <a:alpha val="40000"/>
+                  </a:prstClr>
+                </a:solidFill>
+                <a:effectLst>
+                  <a:outerShdw blurRad="50800" dist="38100" algn="tr" rotWithShape="0">
+                    <a:prstClr val="black">
+                      <a:alpha val="80000"/>
+                    </a:prstClr>
+                  </a:outerShdw>
+                </a:effectLst>
+                <a:latin typeface="Calibri" pitchFamily="34" charset="0"/>
+              </a:defRPr>
+            </a:lvl1pPr>
+          </a:lstStyle>
+          <a:p>
+            <a:pPr algn="ctr"/>
+            <a:r>
+              <a:t>Evaluation only.</a:t>
+            </a:r>
+          </a:p>
+          <a:p>
+            <a:pPr algn="ctr"/>
+            <a:r>
+              <a:t>Created with Aspose.Slides for Java 23.6.</a:t>
+            </a:r>
+          </a:p>
+          <a:p>
+            <a:pPr algn="ctr"/>
+            <a:r>
+              <a:t>Copyright 2004-2023 Aspose Pty Ltd.</a:t>
+            </a:r>
+          </a:p>
+        </p:txBody>
+      </p:sp>
     </p:spTree>
     <p:extLst>
       <p:ext uri="{BB962C8B-B14F-4D97-AF65-F5344CB8AC3E}">
@@ -11959,7 +12527,7 @@
         </p:spPr>
         <p:txBody>
           <a:bodyPr vert="horz" lIns="0" tIns="45720" rIns="0" bIns="45720" rtlCol="0" anchor="ctr">
-            <a:normAutofit fontScale="95000" lnSpcReduction="20000"/>
+            <a:normAutofit/>
           </a:bodyPr>
           <a:lstStyle/>
           <a:p>
@@ -12063,7 +12631,7 @@
         </p:nvGraphicFramePr>
         <p:xfrm>
           <a:off x="1346750" y="930063"/>
-          <a:ext cx="9499602" cy="3855720"/>
+          <a:ext cx="9499602" cy="3419856"/>
         </p:xfrm>
         <a:graphic>
           <a:graphicData uri="http://schemas.openxmlformats.org/drawingml/2006/table">
@@ -12238,6 +12806,77 @@
           </a:graphicData>
         </a:graphic>
       </p:graphicFrame>
+      <p:sp>
+        <p:nvSpPr>
+          <p:cNvPr id="20" name="TextBox"/>
+          <p:cNvSpPr txBox="1">
+            <a:spLocks noGrp="1" noSelect="1" noRot="1" noMove="1"/>
+          </p:cNvSpPr>
+          <p:nvPr/>
+        </p:nvSpPr>
+        <p:spPr>
+          <a:xfrm>
+            <a:off x="2890520" y="2644140"/>
+            <a:ext cx="6411372" cy="1569660"/>
+          </a:xfrm>
+          <a:prstGeom prst="rect">
+            <a:avLst/>
+          </a:prstGeom>
+          <a:noFill/>
+        </p:spPr>
+        <p:txBody>
+          <a:bodyPr wrap="none" rtlCol="0" anchor="ctr" anchorCtr="1">
+            <a:spAutoFit/>
+          </a:bodyPr>
+          <a:lstStyle>
+            <a:lvl1pPr algn="l">
+              <a:lnSpc>
+                <a:spcPct val="150000"/>
+              </a:lnSpc>
+              <a:spcBef>
+                <a:spcPct val="0"/>
+              </a:spcBef>
+              <a:spcAft>
+                <a:spcPct val="0"/>
+              </a:spcAft>
+              <a:defRPr lang="en-US" sz="3200" b="1" noProof="1" dirty="0">
+                <a:solidFill>
+                  <a:prstClr val="red">
+                    <a:lumOff val="30000"/>
+                    <a:alpha val="40000"/>
+                  </a:prstClr>
+                </a:solidFill>
+                <a:effectLst>
+                  <a:outerShdw blurRad="50800" dist="38100" algn="tr" rotWithShape="0">
+                    <a:prstClr val="black">
+                      <a:alpha val="80000"/>
+                    </a:prstClr>
+                  </a:outerShdw>
+                </a:effectLst>
+                <a:latin typeface="Calibri" pitchFamily="34" charset="0"/>
+              </a:defRPr>
+            </a:lvl1pPr>
+          </a:lstStyle>
+          <a:p>
+            <a:pPr algn="ctr"/>
+            <a:r>
+              <a:t>Evaluation only.</a:t>
+            </a:r>
+          </a:p>
+          <a:p>
+            <a:pPr algn="ctr"/>
+            <a:r>
+              <a:t>Created with Aspose.Slides for Java 23.6.</a:t>
+            </a:r>
+          </a:p>
+          <a:p>
+            <a:pPr algn="ctr"/>
+            <a:r>
+              <a:t>Copyright 2004-2023 Aspose Pty Ltd.</a:t>
+            </a:r>
+          </a:p>
+        </p:txBody>
+      </p:sp>
     </p:spTree>
     <p:extLst>
       <p:ext uri="{BB962C8B-B14F-4D97-AF65-F5344CB8AC3E}">
@@ -12519,7 +13158,7 @@
         </p:nvGraphicFramePr>
         <p:xfrm>
           <a:off x="1096963" y="2287915"/>
-          <a:ext cx="10058401" cy="3697554"/>
+          <a:ext cx="10058401" cy="3407281"/>
         </p:xfrm>
         <a:graphic>
           <a:graphicData uri="http://schemas.openxmlformats.org/drawingml/2006/table">
@@ -12629,7 +13268,7 @@
                           <a:ea typeface="Franklin Gothic Book"/>
                           <a:cs typeface="Franklin Gothic Book"/>
                         </a:rPr>
-                        <a:t>té chai premium Mystic Spice</a:t>
+                        <a:t>Té chai premium Mystic Spice</a:t>
                       </a:r>
                       <a:endParaRPr lang="en-US" sz="2300">
                         <a:effectLst/>
@@ -12783,7 +13422,7 @@
                           <a:ea typeface="Franklin Gothic Book"/>
                           <a:cs typeface="Franklin Gothic Book"/>
                         </a:rPr>
-                        <a:t>Combinación auténtica: nuestro té chai es una armoniosa combinación de hojas de té negro premium y una exclusiva selección de especias molidas, como la canela, el cardamomo, el clavo, el jengibre y la pimienta negra.</a:t>
+                        <a:t>Mezcla auténtica: nuestro chai es una mezcla armoniosa de hojas de té negro premium y una selección de especias molidas, incluyendo canela, cardamomo, clavo, jengibre y pimienta negra.</a:t>
                       </a:r>
                       <a:r>
                         <a:rPr lang="es-ES" sz="1400" b="0" i="0" strike="noStrike" cap="none" baseline="0">
@@ -12836,7 +13475,7 @@
                           <a:ea typeface="Franklin Gothic Book"/>
                           <a:cs typeface="Franklin Gothic Book"/>
                         </a:rPr>
-                        <a:t>Ingredientes beneficiosos para la salud: cada ingrediente del té chai Mystic Spice se elige por sus beneficios naturales para la salud.</a:t>
+                        <a:t>Ingredientes beneficiosos para la salud: cada ingrediente del té chai Mystic Spice se elige para sus beneficios naturales para la salud.</a:t>
                       </a:r>
                       <a:r>
                         <a:rPr lang="es-ES" sz="1400" b="0" i="0" strike="noStrike" cap="none" baseline="0">
@@ -12879,6 +13518,77 @@
           </a:graphicData>
         </a:graphic>
       </p:graphicFrame>
+      <p:sp>
+        <p:nvSpPr>
+          <p:cNvPr id="15" name="TextBox"/>
+          <p:cNvSpPr txBox="1">
+            <a:spLocks noGrp="1" noSelect="1" noRot="1" noMove="1"/>
+          </p:cNvSpPr>
+          <p:nvPr/>
+        </p:nvSpPr>
+        <p:spPr>
+          <a:xfrm>
+            <a:off x="2890520" y="2644140"/>
+            <a:ext cx="6411372" cy="1569660"/>
+          </a:xfrm>
+          <a:prstGeom prst="rect">
+            <a:avLst/>
+          </a:prstGeom>
+          <a:noFill/>
+        </p:spPr>
+        <p:txBody>
+          <a:bodyPr wrap="none" rtlCol="0" anchor="ctr" anchorCtr="1">
+            <a:spAutoFit/>
+          </a:bodyPr>
+          <a:lstStyle>
+            <a:lvl1pPr algn="l">
+              <a:lnSpc>
+                <a:spcPct val="150000"/>
+              </a:lnSpc>
+              <a:spcBef>
+                <a:spcPct val="0"/>
+              </a:spcBef>
+              <a:spcAft>
+                <a:spcPct val="0"/>
+              </a:spcAft>
+              <a:defRPr lang="en-US" sz="3200" b="1" noProof="1" dirty="0">
+                <a:solidFill>
+                  <a:prstClr val="red">
+                    <a:lumOff val="30000"/>
+                    <a:alpha val="40000"/>
+                  </a:prstClr>
+                </a:solidFill>
+                <a:effectLst>
+                  <a:outerShdw blurRad="50800" dist="38100" algn="tr" rotWithShape="0">
+                    <a:prstClr val="black">
+                      <a:alpha val="80000"/>
+                    </a:prstClr>
+                  </a:outerShdw>
+                </a:effectLst>
+                <a:latin typeface="Calibri" pitchFamily="34" charset="0"/>
+              </a:defRPr>
+            </a:lvl1pPr>
+          </a:lstStyle>
+          <a:p>
+            <a:pPr algn="ctr"/>
+            <a:r>
+              <a:t>Evaluation only.</a:t>
+            </a:r>
+          </a:p>
+          <a:p>
+            <a:pPr algn="ctr"/>
+            <a:r>
+              <a:t>Created with Aspose.Slides for Java 23.6.</a:t>
+            </a:r>
+          </a:p>
+          <a:p>
+            <a:pPr algn="ctr"/>
+            <a:r>
+              <a:t>Copyright 2004-2023 Aspose Pty Ltd.</a:t>
+            </a:r>
+          </a:p>
+        </p:txBody>
+      </p:sp>
     </p:spTree>
     <p:extLst>
       <p:ext uri="{BB962C8B-B14F-4D97-AF65-F5344CB8AC3E}">
@@ -13274,7 +13984,7 @@
         </p:nvGraphicFramePr>
         <p:xfrm>
           <a:off x="5282335" y="1994843"/>
-          <a:ext cx="6275668" cy="4012742"/>
+          <a:ext cx="6275668" cy="3509822"/>
         </p:xfrm>
         <a:graphic>
           <a:graphicData uri="http://schemas.openxmlformats.org/drawingml/2006/table">
@@ -13437,7 +14147,7 @@
                           <a:ea typeface="Franklin Gothic Book"/>
                           <a:cs typeface="Franklin Gothic Book"/>
                         </a:rPr>
-                        <a:t>Opciones versátiles de preparación: Ya sea que le guste su chai bien caliente, como un refrescante té helado, o como una latte cremoso, nuestra mezcla es lo suficientemente versátil como para adaptarse a cualquier preferencia.</a:t>
+                        <a:t>Opciones versátiles de preparación: ya sea que te guste tu chai bien caliente, o prefieras un refrescante té helado, o un latte cremoso, nuestra mezcla es lo suficientemente versátil como para adaptarse a cualquier preferencia.</a:t>
                       </a:r>
                       <a:r>
                         <a:rPr lang="es-ES" sz="1100" b="0" i="0" strike="noStrike" cap="none" baseline="0">
@@ -13526,7 +14236,7 @@
                           <a:ea typeface="Franklin Gothic Book"/>
                           <a:cs typeface="Franklin Gothic Book"/>
                         </a:rPr>
-                        <a:t>Envase elegante: el té chai Mystic Spice viene en un envase elegante, ecológico, lo que lo convierte en el regalo ideal para los amantes del té o un capricho lujoso para uno mismo.</a:t>
+                        <a:t>Envase elegante: el té chai Mystic Spice viene en un envase elegante, ecológico, lo que lo convierte en el regalo ideal para los amantes del té o un capricho lujoso para ti mismo.</a:t>
                       </a:r>
                       <a:endParaRPr lang="en-US" sz="1700">
                         <a:effectLst/>
@@ -13562,7 +14272,7 @@
                           <a:ea typeface="Franklin Gothic Book"/>
                           <a:cs typeface="Franklin Gothic Book"/>
                         </a:rPr>
-                        <a:t>Garantía de satisfacción del cliente: respaldamos nuestro producto y ofrecemos una garantía de satisfacción.</a:t>
+                        <a:t>Garantía de satisfacción del cliente: Respaldamos nuestro producto y ofrecemos una garantía de satisfacción.</a:t>
                       </a:r>
                       <a:r>
                         <a:rPr lang="es-ES" sz="1100" b="0" i="0" strike="noStrike" cap="none" baseline="0">
@@ -13634,6 +14344,77 @@
           </a:graphicData>
         </a:graphic>
       </p:graphicFrame>
+      <p:sp>
+        <p:nvSpPr>
+          <p:cNvPr id="19" name="TextBox"/>
+          <p:cNvSpPr txBox="1">
+            <a:spLocks noGrp="1" noSelect="1" noRot="1" noMove="1"/>
+          </p:cNvSpPr>
+          <p:nvPr/>
+        </p:nvSpPr>
+        <p:spPr>
+          <a:xfrm>
+            <a:off x="2890520" y="2644140"/>
+            <a:ext cx="6411372" cy="1569660"/>
+          </a:xfrm>
+          <a:prstGeom prst="rect">
+            <a:avLst/>
+          </a:prstGeom>
+          <a:noFill/>
+        </p:spPr>
+        <p:txBody>
+          <a:bodyPr wrap="none" rtlCol="0" anchor="ctr" anchorCtr="1">
+            <a:spAutoFit/>
+          </a:bodyPr>
+          <a:lstStyle>
+            <a:lvl1pPr algn="l">
+              <a:lnSpc>
+                <a:spcPct val="150000"/>
+              </a:lnSpc>
+              <a:spcBef>
+                <a:spcPct val="0"/>
+              </a:spcBef>
+              <a:spcAft>
+                <a:spcPct val="0"/>
+              </a:spcAft>
+              <a:defRPr lang="en-US" sz="3200" b="1" noProof="1" dirty="0">
+                <a:solidFill>
+                  <a:prstClr val="red">
+                    <a:lumOff val="30000"/>
+                    <a:alpha val="40000"/>
+                  </a:prstClr>
+                </a:solidFill>
+                <a:effectLst>
+                  <a:outerShdw blurRad="50800" dist="38100" algn="tr" rotWithShape="0">
+                    <a:prstClr val="black">
+                      <a:alpha val="80000"/>
+                    </a:prstClr>
+                  </a:outerShdw>
+                </a:effectLst>
+                <a:latin typeface="Calibri" pitchFamily="34" charset="0"/>
+              </a:defRPr>
+            </a:lvl1pPr>
+          </a:lstStyle>
+          <a:p>
+            <a:pPr algn="ctr"/>
+            <a:r>
+              <a:t>Evaluation only.</a:t>
+            </a:r>
+          </a:p>
+          <a:p>
+            <a:pPr algn="ctr"/>
+            <a:r>
+              <a:t>Created with Aspose.Slides for Java 23.6.</a:t>
+            </a:r>
+          </a:p>
+          <a:p>
+            <a:pPr algn="ctr"/>
+            <a:r>
+              <a:t>Copyright 2004-2023 Aspose Pty Ltd.</a:t>
+            </a:r>
+          </a:p>
+        </p:txBody>
+      </p:sp>
     </p:spTree>
     <p:extLst>
       <p:ext uri="{BB962C8B-B14F-4D97-AF65-F5344CB8AC3E}">
@@ -13971,7 +14752,7 @@
         </p:spPr>
         <p:txBody>
           <a:bodyPr vert="horz" lIns="0" tIns="45720" rIns="0" bIns="45720" rtlCol="0">
-            <a:normAutofit fontScale="92500" lnSpcReduction="20000"/>
+            <a:normAutofit fontScale="95000" lnSpcReduction="20000"/>
           </a:bodyPr>
           <a:lstStyle/>
           <a:p>
@@ -14232,7 +15013,7 @@
         </p:nvGraphicFramePr>
         <p:xfrm>
           <a:off x="643192" y="1541387"/>
-          <a:ext cx="5115348" cy="5556972"/>
+          <a:ext cx="5115348" cy="4642572"/>
         </p:xfrm>
         <a:graphic>
           <a:graphicData uri="http://schemas.openxmlformats.org/drawingml/2006/table">
@@ -14645,6 +15426,77 @@
           </a:graphicData>
         </a:graphic>
       </p:graphicFrame>
+      <p:sp>
+        <p:nvSpPr>
+          <p:cNvPr id="20" name="TextBox"/>
+          <p:cNvSpPr txBox="1">
+            <a:spLocks noGrp="1" noSelect="1" noRot="1" noMove="1"/>
+          </p:cNvSpPr>
+          <p:nvPr/>
+        </p:nvSpPr>
+        <p:spPr>
+          <a:xfrm>
+            <a:off x="2890520" y="2644140"/>
+            <a:ext cx="6411372" cy="1569660"/>
+          </a:xfrm>
+          <a:prstGeom prst="rect">
+            <a:avLst/>
+          </a:prstGeom>
+          <a:noFill/>
+        </p:spPr>
+        <p:txBody>
+          <a:bodyPr wrap="none" rtlCol="0" anchor="ctr" anchorCtr="1">
+            <a:spAutoFit/>
+          </a:bodyPr>
+          <a:lstStyle>
+            <a:lvl1pPr algn="l">
+              <a:lnSpc>
+                <a:spcPct val="150000"/>
+              </a:lnSpc>
+              <a:spcBef>
+                <a:spcPct val="0"/>
+              </a:spcBef>
+              <a:spcAft>
+                <a:spcPct val="0"/>
+              </a:spcAft>
+              <a:defRPr lang="en-US" sz="3200" b="1" noProof="1" dirty="0">
+                <a:solidFill>
+                  <a:prstClr val="red">
+                    <a:lumOff val="30000"/>
+                    <a:alpha val="40000"/>
+                  </a:prstClr>
+                </a:solidFill>
+                <a:effectLst>
+                  <a:outerShdw blurRad="50800" dist="38100" algn="tr" rotWithShape="0">
+                    <a:prstClr val="black">
+                      <a:alpha val="80000"/>
+                    </a:prstClr>
+                  </a:outerShdw>
+                </a:effectLst>
+                <a:latin typeface="Calibri" pitchFamily="34" charset="0"/>
+              </a:defRPr>
+            </a:lvl1pPr>
+          </a:lstStyle>
+          <a:p>
+            <a:pPr algn="ctr"/>
+            <a:r>
+              <a:t>Evaluation only.</a:t>
+            </a:r>
+          </a:p>
+          <a:p>
+            <a:pPr algn="ctr"/>
+            <a:r>
+              <a:t>Created with Aspose.Slides for Java 23.6.</a:t>
+            </a:r>
+          </a:p>
+          <a:p>
+            <a:pPr algn="ctr"/>
+            <a:r>
+              <a:t>Copyright 2004-2023 Aspose Pty Ltd.</a:t>
+            </a:r>
+          </a:p>
+        </p:txBody>
+      </p:sp>
     </p:spTree>
     <p:extLst>
       <p:ext uri="{BB962C8B-B14F-4D97-AF65-F5344CB8AC3E}">
@@ -14872,7 +15724,7 @@
         </p:spPr>
         <p:txBody>
           <a:bodyPr anchor="ctr">
-            <a:normAutofit lnSpcReduction="20000"/>
+            <a:normAutofit fontScale="97500" lnSpcReduction="10000"/>
           </a:bodyPr>
           <a:lstStyle/>
           <a:p>
@@ -14975,6 +15827,77 @@
                 <a:cs typeface="Franklin Gothic Book"/>
               </a:rPr>
               <a:t>Distribuidores: transportan los productos de té chai desde los fabricantes hasta los minoristas</a:t>
+            </a:r>
+          </a:p>
+        </p:txBody>
+      </p:sp>
+      <p:sp>
+        <p:nvSpPr>
+          <p:cNvPr id="11" name="TextBox"/>
+          <p:cNvSpPr txBox="1">
+            <a:spLocks noGrp="1" noSelect="1" noRot="1" noMove="1"/>
+          </p:cNvSpPr>
+          <p:nvPr/>
+        </p:nvSpPr>
+        <p:spPr>
+          <a:xfrm>
+            <a:off x="2890520" y="2644140"/>
+            <a:ext cx="6411372" cy="1569660"/>
+          </a:xfrm>
+          <a:prstGeom prst="rect">
+            <a:avLst/>
+          </a:prstGeom>
+          <a:noFill/>
+        </p:spPr>
+        <p:txBody>
+          <a:bodyPr wrap="none" rtlCol="0" anchor="ctr" anchorCtr="1">
+            <a:spAutoFit/>
+          </a:bodyPr>
+          <a:lstStyle>
+            <a:lvl1pPr algn="l">
+              <a:lnSpc>
+                <a:spcPct val="150000"/>
+              </a:lnSpc>
+              <a:spcBef>
+                <a:spcPct val="0"/>
+              </a:spcBef>
+              <a:spcAft>
+                <a:spcPct val="0"/>
+              </a:spcAft>
+              <a:defRPr lang="en-US" sz="3200" b="1" noProof="1" dirty="0">
+                <a:solidFill>
+                  <a:prstClr val="red">
+                    <a:lumOff val="30000"/>
+                    <a:alpha val="40000"/>
+                  </a:prstClr>
+                </a:solidFill>
+                <a:effectLst>
+                  <a:outerShdw blurRad="50800" dist="38100" algn="tr" rotWithShape="0">
+                    <a:prstClr val="black">
+                      <a:alpha val="80000"/>
+                    </a:prstClr>
+                  </a:outerShdw>
+                </a:effectLst>
+                <a:latin typeface="Calibri" pitchFamily="34" charset="0"/>
+              </a:defRPr>
+            </a:lvl1pPr>
+          </a:lstStyle>
+          <a:p>
+            <a:pPr algn="ctr"/>
+            <a:r>
+              <a:t>Evaluation only.</a:t>
+            </a:r>
+          </a:p>
+          <a:p>
+            <a:pPr algn="ctr"/>
+            <a:r>
+              <a:t>Created with Aspose.Slides for Java 23.6.</a:t>
+            </a:r>
+          </a:p>
+          <a:p>
+            <a:pPr algn="ctr"/>
+            <a:r>
+              <a:t>Copyright 2004-2023 Aspose Pty Ltd.</a:t>
             </a:r>
           </a:p>
         </p:txBody>
@@ -15206,7 +16129,7 @@
         </p:spPr>
         <p:txBody>
           <a:bodyPr anchor="ctr">
-            <a:normAutofit lnSpcReduction="10000"/>
+            <a:normAutofit/>
           </a:bodyPr>
           <a:lstStyle/>
           <a:p>
@@ -15279,6 +16202,77 @@
                 <a:cs typeface="Franklin Gothic Book"/>
               </a:rPr>
               <a:t>Los mayoristas ofrecen información del mercado, comentarios y mecanismos de crédito</a:t>
+            </a:r>
+          </a:p>
+        </p:txBody>
+      </p:sp>
+      <p:sp>
+        <p:nvSpPr>
+          <p:cNvPr id="11" name="TextBox"/>
+          <p:cNvSpPr txBox="1">
+            <a:spLocks noGrp="1" noSelect="1" noRot="1" noMove="1"/>
+          </p:cNvSpPr>
+          <p:nvPr/>
+        </p:nvSpPr>
+        <p:spPr>
+          <a:xfrm>
+            <a:off x="2890520" y="2644140"/>
+            <a:ext cx="6411372" cy="1569660"/>
+          </a:xfrm>
+          <a:prstGeom prst="rect">
+            <a:avLst/>
+          </a:prstGeom>
+          <a:noFill/>
+        </p:spPr>
+        <p:txBody>
+          <a:bodyPr wrap="none" rtlCol="0" anchor="ctr" anchorCtr="1">
+            <a:spAutoFit/>
+          </a:bodyPr>
+          <a:lstStyle>
+            <a:lvl1pPr algn="l">
+              <a:lnSpc>
+                <a:spcPct val="150000"/>
+              </a:lnSpc>
+              <a:spcBef>
+                <a:spcPct val="0"/>
+              </a:spcBef>
+              <a:spcAft>
+                <a:spcPct val="0"/>
+              </a:spcAft>
+              <a:defRPr lang="en-US" sz="3200" b="1" noProof="1" dirty="0">
+                <a:solidFill>
+                  <a:prstClr val="red">
+                    <a:lumOff val="30000"/>
+                    <a:alpha val="40000"/>
+                  </a:prstClr>
+                </a:solidFill>
+                <a:effectLst>
+                  <a:outerShdw blurRad="50800" dist="38100" algn="tr" rotWithShape="0">
+                    <a:prstClr val="black">
+                      <a:alpha val="80000"/>
+                    </a:prstClr>
+                  </a:outerShdw>
+                </a:effectLst>
+                <a:latin typeface="Calibri" pitchFamily="34" charset="0"/>
+              </a:defRPr>
+            </a:lvl1pPr>
+          </a:lstStyle>
+          <a:p>
+            <a:pPr algn="ctr"/>
+            <a:r>
+              <a:t>Evaluation only.</a:t>
+            </a:r>
+          </a:p>
+          <a:p>
+            <a:pPr algn="ctr"/>
+            <a:r>
+              <a:t>Created with Aspose.Slides for Java 23.6.</a:t>
+            </a:r>
+          </a:p>
+          <a:p>
+            <a:pPr algn="ctr"/>
+            <a:r>
+              <a:t>Copyright 2004-2023 Aspose Pty Ltd.</a:t>
             </a:r>
           </a:p>
         </p:txBody>
@@ -15300,10 +16294,10 @@
 
 <file path=ppt/tags/tag1.xml><?xml version="1.0" encoding="utf-8"?>
 <p:tagLst xmlns:p="http://schemas.openxmlformats.org/presentationml/2006/main">
-  <p:tag name="AS_OS" val="Unix 3.10.0.1160"/>
+  <p:tag name="AS_OS" val="Microsoft Windows NT 10.0"/>
   <p:tag name="AS_RELEASE_DATE" val="2023.06.30"/>
   <p:tag name="AS_TITLE" val="Aspose.Slides for Java"/>
-  <p:tag name="AS_VERSION" val="23.6.1"/>
+  <p:tag name="AS_VERSION" val="23.6"/>
 </p:tagLst>
 </file>
 

</xml_diff>